<commit_message>
Updated code diagram and final presentation slides
</commit_message>
<xml_diff>
--- a/Code_Diagram.pptx
+++ b/Code_Diagram.pptx
@@ -3340,7 +3340,7 @@
         </p:nvSpPr>
         <p:spPr>
           <a:xfrm>
-            <a:off x="535709" y="2860555"/>
+            <a:off x="809175" y="2860555"/>
             <a:ext cx="2225964" cy="1459345"/>
           </a:xfrm>
           <a:prstGeom prst="roundRect">
@@ -3396,7 +3396,7 @@
         </p:nvSpPr>
         <p:spPr>
           <a:xfrm>
-            <a:off x="535709" y="417947"/>
+            <a:off x="213687" y="204124"/>
             <a:ext cx="2225964" cy="1459345"/>
           </a:xfrm>
           <a:prstGeom prst="roundRect">
@@ -3456,7 +3456,7 @@
         </p:nvSpPr>
         <p:spPr>
           <a:xfrm>
-            <a:off x="3516767" y="204124"/>
+            <a:off x="3790233" y="204124"/>
             <a:ext cx="2225964" cy="1459345"/>
           </a:xfrm>
           <a:prstGeom prst="roundRect">
@@ -3513,7 +3513,7 @@
         </p:nvSpPr>
         <p:spPr>
           <a:xfrm>
-            <a:off x="3516767" y="1867593"/>
+            <a:off x="3790233" y="1867593"/>
             <a:ext cx="2225964" cy="1459345"/>
           </a:xfrm>
           <a:prstGeom prst="roundRect">
@@ -3570,7 +3570,7 @@
         </p:nvSpPr>
         <p:spPr>
           <a:xfrm>
-            <a:off x="3516767" y="3531062"/>
+            <a:off x="3790233" y="3531062"/>
             <a:ext cx="2225964" cy="1459345"/>
           </a:xfrm>
           <a:prstGeom prst="roundRect">
@@ -3631,7 +3631,7 @@
         </p:nvCxnSpPr>
         <p:spPr>
           <a:xfrm flipV="1">
-            <a:off x="2761673" y="933797"/>
+            <a:off x="3035139" y="933797"/>
             <a:ext cx="755094" cy="2656431"/>
           </a:xfrm>
           <a:prstGeom prst="straightConnector1">
@@ -3674,7 +3674,7 @@
         </p:nvCxnSpPr>
         <p:spPr>
           <a:xfrm flipV="1">
-            <a:off x="2761673" y="2597266"/>
+            <a:off x="3035139" y="2597266"/>
             <a:ext cx="755094" cy="992962"/>
           </a:xfrm>
           <a:prstGeom prst="straightConnector1">
@@ -3717,7 +3717,7 @@
         </p:nvCxnSpPr>
         <p:spPr>
           <a:xfrm>
-            <a:off x="2761673" y="3590228"/>
+            <a:off x="3035139" y="3590228"/>
             <a:ext cx="755094" cy="670507"/>
           </a:xfrm>
           <a:prstGeom prst="straightConnector1">
@@ -3756,7 +3756,7 @@
         </p:nvSpPr>
         <p:spPr>
           <a:xfrm>
-            <a:off x="3516767" y="5194531"/>
+            <a:off x="3790233" y="5194531"/>
             <a:ext cx="2225964" cy="1459345"/>
           </a:xfrm>
           <a:prstGeom prst="roundRect">
@@ -3817,7 +3817,7 @@
         </p:nvCxnSpPr>
         <p:spPr>
           <a:xfrm>
-            <a:off x="2761673" y="3590228"/>
+            <a:off x="3035139" y="3590228"/>
             <a:ext cx="755094" cy="2333976"/>
           </a:xfrm>
           <a:prstGeom prst="straightConnector1">
@@ -3856,7 +3856,7 @@
         </p:nvSpPr>
         <p:spPr>
           <a:xfrm>
-            <a:off x="6497825" y="204123"/>
+            <a:off x="6771291" y="204123"/>
             <a:ext cx="2225964" cy="6449753"/>
           </a:xfrm>
           <a:prstGeom prst="roundRect">
@@ -3913,7 +3913,7 @@
         </p:nvSpPr>
         <p:spPr>
           <a:xfrm>
-            <a:off x="535709" y="5049573"/>
+            <a:off x="213687" y="5194531"/>
             <a:ext cx="2225964" cy="1459345"/>
           </a:xfrm>
           <a:prstGeom prst="roundRect">
@@ -3951,54 +3951,11 @@
             <a:pPr algn="ctr"/>
             <a:r>
               <a:rPr lang="en-US" sz="1400" dirty="0"/>
-              <a:t>Creates a fancy table with the summary of each attribute in training data</a:t>
-            </a:r>
-          </a:p>
-        </p:txBody>
-      </p:sp>
-      <p:cxnSp>
-        <p:nvCxnSpPr>
-          <p:cNvPr id="29" name="Straight Arrow Connector 28">
-            <a:extLst>
-              <a:ext uri="{FF2B5EF4-FFF2-40B4-BE49-F238E27FC236}">
-                <a16:creationId xmlns:a16="http://schemas.microsoft.com/office/drawing/2014/main" id="{5913C77D-C445-DE1E-F4B6-3F4E0A32739A}"/>
-              </a:ext>
-            </a:extLst>
-          </p:cNvPr>
-          <p:cNvCxnSpPr>
-            <a:cxnSpLocks/>
-            <a:stCxn id="4" idx="2"/>
-            <a:endCxn id="28" idx="0"/>
-          </p:cNvCxnSpPr>
-          <p:nvPr/>
-        </p:nvCxnSpPr>
-        <p:spPr>
-          <a:xfrm>
-            <a:off x="1648691" y="4319900"/>
-            <a:ext cx="0" cy="729673"/>
-          </a:xfrm>
-          <a:prstGeom prst="straightConnector1">
-            <a:avLst/>
-          </a:prstGeom>
-          <a:ln w="38100">
-            <a:tailEnd type="triangle"/>
-          </a:ln>
-        </p:spPr>
-        <p:style>
-          <a:lnRef idx="1">
-            <a:schemeClr val="accent1"/>
-          </a:lnRef>
-          <a:fillRef idx="0">
-            <a:schemeClr val="accent1"/>
-          </a:fillRef>
-          <a:effectRef idx="0">
-            <a:schemeClr val="accent1"/>
-          </a:effectRef>
-          <a:fontRef idx="minor">
-            <a:schemeClr val="tx1"/>
-          </a:fontRef>
-        </p:style>
-      </p:cxnSp>
+              <a:t>Creates a fancy table with the summary of each attribute of the entire  training set.</a:t>
+            </a:r>
+          </a:p>
+        </p:txBody>
+      </p:sp>
       <p:cxnSp>
         <p:nvCxnSpPr>
           <p:cNvPr id="32" name="Straight Arrow Connector 31">
@@ -4016,7 +3973,7 @@
         </p:nvCxnSpPr>
         <p:spPr>
           <a:xfrm>
-            <a:off x="5742731" y="933797"/>
+            <a:off x="6016197" y="933797"/>
             <a:ext cx="731520" cy="0"/>
           </a:xfrm>
           <a:prstGeom prst="straightConnector1">
@@ -4058,7 +4015,7 @@
         </p:nvCxnSpPr>
         <p:spPr>
           <a:xfrm>
-            <a:off x="5742731" y="2597266"/>
+            <a:off x="6016197" y="2597266"/>
             <a:ext cx="731520" cy="0"/>
           </a:xfrm>
           <a:prstGeom prst="straightConnector1">
@@ -4100,7 +4057,7 @@
         </p:nvCxnSpPr>
         <p:spPr>
           <a:xfrm>
-            <a:off x="5742731" y="4260735"/>
+            <a:off x="6016197" y="4260735"/>
             <a:ext cx="731520" cy="0"/>
           </a:xfrm>
           <a:prstGeom prst="straightConnector1">
@@ -4142,7 +4099,7 @@
         </p:nvCxnSpPr>
         <p:spPr>
           <a:xfrm flipV="1">
-            <a:off x="5742731" y="5924203"/>
+            <a:off x="6016197" y="5924203"/>
             <a:ext cx="731520" cy="1"/>
           </a:xfrm>
           <a:prstGeom prst="straightConnector1">
@@ -4181,7 +4138,7 @@
         </p:nvSpPr>
         <p:spPr>
           <a:xfrm>
-            <a:off x="9478883" y="2699328"/>
+            <a:off x="9752349" y="2699328"/>
             <a:ext cx="2225964" cy="1459345"/>
           </a:xfrm>
           <a:prstGeom prst="roundRect">
@@ -4243,7 +4200,7 @@
         </p:nvCxnSpPr>
         <p:spPr>
           <a:xfrm>
-            <a:off x="8723789" y="3429000"/>
+            <a:off x="8997255" y="3429000"/>
             <a:ext cx="755094" cy="1"/>
           </a:xfrm>
           <a:prstGeom prst="straightConnector1">

</xml_diff>